<commit_message>
Update figures and upload pledge
</commit_message>
<xml_diff>
--- a/Figure.pptx
+++ b/Figure.pptx
@@ -254,7 +254,7 @@
           <a:p>
             <a:fld id="{A1834766-88F6-411A-AB82-D167DC2E77CF}" type="datetimeFigureOut">
               <a:rPr lang="en-GB" smtClean="0"/>
-              <a:t>28/03/2021</a:t>
+              <a:t>02/04/2021</a:t>
             </a:fld>
             <a:endParaRPr lang="en-GB"/>
           </a:p>
@@ -424,7 +424,7 @@
           <a:p>
             <a:fld id="{A1834766-88F6-411A-AB82-D167DC2E77CF}" type="datetimeFigureOut">
               <a:rPr lang="en-GB" smtClean="0"/>
-              <a:t>28/03/2021</a:t>
+              <a:t>02/04/2021</a:t>
             </a:fld>
             <a:endParaRPr lang="en-GB"/>
           </a:p>
@@ -604,7 +604,7 @@
           <a:p>
             <a:fld id="{A1834766-88F6-411A-AB82-D167DC2E77CF}" type="datetimeFigureOut">
               <a:rPr lang="en-GB" smtClean="0"/>
-              <a:t>28/03/2021</a:t>
+              <a:t>02/04/2021</a:t>
             </a:fld>
             <a:endParaRPr lang="en-GB"/>
           </a:p>
@@ -774,7 +774,7 @@
           <a:p>
             <a:fld id="{A1834766-88F6-411A-AB82-D167DC2E77CF}" type="datetimeFigureOut">
               <a:rPr lang="en-GB" smtClean="0"/>
-              <a:t>28/03/2021</a:t>
+              <a:t>02/04/2021</a:t>
             </a:fld>
             <a:endParaRPr lang="en-GB"/>
           </a:p>
@@ -1018,7 +1018,7 @@
           <a:p>
             <a:fld id="{A1834766-88F6-411A-AB82-D167DC2E77CF}" type="datetimeFigureOut">
               <a:rPr lang="en-GB" smtClean="0"/>
-              <a:t>28/03/2021</a:t>
+              <a:t>02/04/2021</a:t>
             </a:fld>
             <a:endParaRPr lang="en-GB"/>
           </a:p>
@@ -1250,7 +1250,7 @@
           <a:p>
             <a:fld id="{A1834766-88F6-411A-AB82-D167DC2E77CF}" type="datetimeFigureOut">
               <a:rPr lang="en-GB" smtClean="0"/>
-              <a:t>28/03/2021</a:t>
+              <a:t>02/04/2021</a:t>
             </a:fld>
             <a:endParaRPr lang="en-GB"/>
           </a:p>
@@ -1617,7 +1617,7 @@
           <a:p>
             <a:fld id="{A1834766-88F6-411A-AB82-D167DC2E77CF}" type="datetimeFigureOut">
               <a:rPr lang="en-GB" smtClean="0"/>
-              <a:t>28/03/2021</a:t>
+              <a:t>02/04/2021</a:t>
             </a:fld>
             <a:endParaRPr lang="en-GB"/>
           </a:p>
@@ -1735,7 +1735,7 @@
           <a:p>
             <a:fld id="{A1834766-88F6-411A-AB82-D167DC2E77CF}" type="datetimeFigureOut">
               <a:rPr lang="en-GB" smtClean="0"/>
-              <a:t>28/03/2021</a:t>
+              <a:t>02/04/2021</a:t>
             </a:fld>
             <a:endParaRPr lang="en-GB"/>
           </a:p>
@@ -1830,7 +1830,7 @@
           <a:p>
             <a:fld id="{A1834766-88F6-411A-AB82-D167DC2E77CF}" type="datetimeFigureOut">
               <a:rPr lang="en-GB" smtClean="0"/>
-              <a:t>28/03/2021</a:t>
+              <a:t>02/04/2021</a:t>
             </a:fld>
             <a:endParaRPr lang="en-GB"/>
           </a:p>
@@ -2107,7 +2107,7 @@
           <a:p>
             <a:fld id="{A1834766-88F6-411A-AB82-D167DC2E77CF}" type="datetimeFigureOut">
               <a:rPr lang="en-GB" smtClean="0"/>
-              <a:t>28/03/2021</a:t>
+              <a:t>02/04/2021</a:t>
             </a:fld>
             <a:endParaRPr lang="en-GB"/>
           </a:p>
@@ -2364,7 +2364,7 @@
           <a:p>
             <a:fld id="{A1834766-88F6-411A-AB82-D167DC2E77CF}" type="datetimeFigureOut">
               <a:rPr lang="en-GB" smtClean="0"/>
-              <a:t>28/03/2021</a:t>
+              <a:t>02/04/2021</a:t>
             </a:fld>
             <a:endParaRPr lang="en-GB"/>
           </a:p>
@@ -2577,7 +2577,7 @@
           <a:p>
             <a:fld id="{A1834766-88F6-411A-AB82-D167DC2E77CF}" type="datetimeFigureOut">
               <a:rPr lang="en-GB" smtClean="0"/>
-              <a:t>28/03/2021</a:t>
+              <a:t>02/04/2021</a:t>
             </a:fld>
             <a:endParaRPr lang="en-GB"/>
           </a:p>
@@ -3004,14 +3004,13 @@
               </a:ext>
             </a:extLst>
           </a:blip>
-          <a:stretch>
-            <a:fillRect/>
-          </a:stretch>
+          <a:srcRect/>
+          <a:stretch/>
         </p:blipFill>
         <p:spPr>
           <a:xfrm>
             <a:off x="-793" y="4860131"/>
-            <a:ext cx="9720263" cy="4860132"/>
+            <a:ext cx="9720263" cy="4860131"/>
           </a:xfrm>
           <a:prstGeom prst="rect">
             <a:avLst/>
@@ -3040,14 +3039,13 @@
               </a:ext>
             </a:extLst>
           </a:blip>
-          <a:stretch>
-            <a:fillRect/>
-          </a:stretch>
+          <a:srcRect/>
+          <a:stretch/>
         </p:blipFill>
         <p:spPr>
           <a:xfrm>
             <a:off x="-793" y="0"/>
-            <a:ext cx="9721056" cy="4874415"/>
+            <a:ext cx="9721055" cy="4874415"/>
           </a:xfrm>
           <a:prstGeom prst="rect">
             <a:avLst/>

</xml_diff>